<commit_message>
work on chapter 1
</commit_message>
<xml_diff>
--- a/openpyxl/Mastering_Python’s_openpyxl.pptx
+++ b/openpyxl/Mastering_Python’s_openpyxl.pptx
@@ -6334,49 +6334,6 @@
           </a:effectLst>
         </p:spPr>
       </p:pic>
-      <p:pic>
-        <p:nvPicPr>
-          <p:cNvPr id="6" name="Picture 5">
-            <a:extLst>
-              <a:ext uri="{FF2B5EF4-FFF2-40B4-BE49-F238E27FC236}">
-                <a16:creationId xmlns:a16="http://schemas.microsoft.com/office/drawing/2014/main" id="{72CC9015-B7F3-F24D-B127-B0466DA3C996}"/>
-              </a:ext>
-            </a:extLst>
-          </p:cNvPr>
-          <p:cNvPicPr>
-            <a:picLocks noChangeAspect="1"/>
-          </p:cNvPicPr>
-          <p:nvPr/>
-        </p:nvPicPr>
-        <p:blipFill>
-          <a:blip r:embed="rId3"/>
-          <a:stretch>
-            <a:fillRect/>
-          </a:stretch>
-        </p:blipFill>
-        <p:spPr>
-          <a:xfrm>
-            <a:off x="5768554" y="4123267"/>
-            <a:ext cx="4915586" cy="2010056"/>
-          </a:xfrm>
-          <a:prstGeom prst="roundRect">
-            <a:avLst>
-              <a:gd name="adj" fmla="val 8594"/>
-            </a:avLst>
-          </a:prstGeom>
-          <a:solidFill>
-            <a:srgbClr val="FFFFFF">
-              <a:shade val="85000"/>
-            </a:srgbClr>
-          </a:solidFill>
-          <a:ln>
-            <a:noFill/>
-          </a:ln>
-          <a:effectLst>
-            <a:reflection blurRad="12700" stA="38000" endPos="28000" dist="5000" dir="5400000" sy="-100000" algn="bl" rotWithShape="0"/>
-          </a:effectLst>
-        </p:spPr>
-      </p:pic>
       <p:sp>
         <p:nvSpPr>
           <p:cNvPr id="7" name="TextBox 6">
@@ -6453,7 +6410,7 @@
           <p:nvPr/>
         </p:nvPicPr>
         <p:blipFill>
-          <a:blip r:embed="rId4">
+          <a:blip r:embed="rId3">
             <a:alphaModFix amt="85000"/>
           </a:blip>
           <a:stretch>
@@ -6462,7 +6419,7 @@
         </p:blipFill>
         <p:spPr>
           <a:xfrm>
-            <a:off x="543651" y="2990474"/>
+            <a:off x="96611" y="2780714"/>
             <a:ext cx="5024357" cy="3359525"/>
           </a:xfrm>
           <a:prstGeom prst="roundRect">
@@ -6513,7 +6470,7 @@
         <p:spPr>
           <a:xfrm>
             <a:off x="3891280" y="386081"/>
-            <a:ext cx="8310880" cy="3169920"/>
+            <a:ext cx="8310880" cy="2813990"/>
           </a:xfrm>
         </p:spPr>
         <p:txBody>
@@ -6563,6 +6520,89 @@
           </a:p>
         </p:txBody>
       </p:sp>
+      <p:pic>
+        <p:nvPicPr>
+          <p:cNvPr id="11" name="Picture 10">
+            <a:extLst>
+              <a:ext uri="{FF2B5EF4-FFF2-40B4-BE49-F238E27FC236}">
+                <a16:creationId xmlns:a16="http://schemas.microsoft.com/office/drawing/2014/main" id="{0793CF43-D6DF-EC40-980C-97D5EFDF76A1}"/>
+              </a:ext>
+            </a:extLst>
+          </p:cNvPr>
+          <p:cNvPicPr>
+            <a:picLocks noChangeAspect="1"/>
+          </p:cNvPicPr>
+          <p:nvPr/>
+        </p:nvPicPr>
+        <p:blipFill>
+          <a:blip r:embed="rId4"/>
+          <a:stretch>
+            <a:fillRect/>
+          </a:stretch>
+        </p:blipFill>
+        <p:spPr>
+          <a:xfrm>
+            <a:off x="7914382" y="3285444"/>
+            <a:ext cx="4030076" cy="3359525"/>
+          </a:xfrm>
+          <a:prstGeom prst="rect">
+            <a:avLst/>
+          </a:prstGeom>
+          <a:ln>
+            <a:noFill/>
+          </a:ln>
+          <a:effectLst>
+            <a:outerShdw blurRad="292100" dist="139700" dir="2700000" algn="tl" rotWithShape="0">
+              <a:srgbClr val="333333">
+                <a:alpha val="65000"/>
+              </a:srgbClr>
+            </a:outerShdw>
+          </a:effectLst>
+        </p:spPr>
+      </p:pic>
+      <p:pic>
+        <p:nvPicPr>
+          <p:cNvPr id="6" name="Picture 5">
+            <a:extLst>
+              <a:ext uri="{FF2B5EF4-FFF2-40B4-BE49-F238E27FC236}">
+                <a16:creationId xmlns:a16="http://schemas.microsoft.com/office/drawing/2014/main" id="{72CC9015-B7F3-F24D-B127-B0466DA3C996}"/>
+              </a:ext>
+            </a:extLst>
+          </p:cNvPr>
+          <p:cNvPicPr>
+            <a:picLocks noChangeAspect="1"/>
+          </p:cNvPicPr>
+          <p:nvPr/>
+        </p:nvPicPr>
+        <p:blipFill>
+          <a:blip r:embed="rId5"/>
+          <a:stretch>
+            <a:fillRect/>
+          </a:stretch>
+        </p:blipFill>
+        <p:spPr>
+          <a:xfrm>
+            <a:off x="4200024" y="3930857"/>
+            <a:ext cx="3615903" cy="1478596"/>
+          </a:xfrm>
+          <a:prstGeom prst="roundRect">
+            <a:avLst>
+              <a:gd name="adj" fmla="val 8594"/>
+            </a:avLst>
+          </a:prstGeom>
+          <a:solidFill>
+            <a:srgbClr val="FFFFFF">
+              <a:shade val="85000"/>
+            </a:srgbClr>
+          </a:solidFill>
+          <a:ln>
+            <a:noFill/>
+          </a:ln>
+          <a:effectLst>
+            <a:reflection blurRad="12700" stA="38000" endPos="28000" dist="5000" dir="5400000" sy="-100000" algn="bl" rotWithShape="0"/>
+          </a:effectLst>
+        </p:spPr>
+      </p:pic>
     </p:spTree>
     <p:extLst>
       <p:ext uri="{BB962C8B-B14F-4D97-AF65-F5344CB8AC3E}">
@@ -6573,6 +6613,142 @@
   <p:clrMapOvr>
     <a:masterClrMapping/>
   </p:clrMapOvr>
+  <p:timing>
+    <p:tnLst>
+      <p:par>
+        <p:cTn id="1" dur="indefinite" restart="never" nodeType="tmRoot">
+          <p:childTnLst>
+            <p:seq concurrent="1" nextAc="seek">
+              <p:cTn id="2" dur="indefinite" nodeType="mainSeq">
+                <p:childTnLst>
+                  <p:par>
+                    <p:cTn id="3" fill="hold">
+                      <p:stCondLst>
+                        <p:cond delay="indefinite"/>
+                      </p:stCondLst>
+                      <p:childTnLst>
+                        <p:par>
+                          <p:cTn id="4" fill="hold">
+                            <p:stCondLst>
+                              <p:cond delay="0"/>
+                            </p:stCondLst>
+                            <p:childTnLst>
+                              <p:par>
+                                <p:cTn id="5" presetID="22" presetClass="entr" presetSubtype="2" fill="hold" nodeType="clickEffect">
+                                  <p:stCondLst>
+                                    <p:cond delay="0"/>
+                                  </p:stCondLst>
+                                  <p:childTnLst>
+                                    <p:set>
+                                      <p:cBhvr>
+                                        <p:cTn id="6" dur="1" fill="hold">
+                                          <p:stCondLst>
+                                            <p:cond delay="0"/>
+                                          </p:stCondLst>
+                                        </p:cTn>
+                                        <p:tgtEl>
+                                          <p:spTgt spid="11"/>
+                                        </p:tgtEl>
+                                        <p:attrNameLst>
+                                          <p:attrName>style.visibility</p:attrName>
+                                        </p:attrNameLst>
+                                      </p:cBhvr>
+                                      <p:to>
+                                        <p:strVal val="visible"/>
+                                      </p:to>
+                                    </p:set>
+                                    <p:animEffect transition="in" filter="wipe(right)">
+                                      <p:cBhvr>
+                                        <p:cTn id="7" dur="500"/>
+                                        <p:tgtEl>
+                                          <p:spTgt spid="11"/>
+                                        </p:tgtEl>
+                                      </p:cBhvr>
+                                    </p:animEffect>
+                                  </p:childTnLst>
+                                </p:cTn>
+                              </p:par>
+                            </p:childTnLst>
+                          </p:cTn>
+                        </p:par>
+                      </p:childTnLst>
+                    </p:cTn>
+                  </p:par>
+                  <p:par>
+                    <p:cTn id="8" fill="hold">
+                      <p:stCondLst>
+                        <p:cond delay="indefinite"/>
+                      </p:stCondLst>
+                      <p:childTnLst>
+                        <p:par>
+                          <p:cTn id="9" fill="hold">
+                            <p:stCondLst>
+                              <p:cond delay="0"/>
+                            </p:stCondLst>
+                            <p:childTnLst>
+                              <p:par>
+                                <p:cTn id="10" presetID="21" presetClass="entr" presetSubtype="1" fill="hold" nodeType="clickEffect">
+                                  <p:stCondLst>
+                                    <p:cond delay="0"/>
+                                  </p:stCondLst>
+                                  <p:childTnLst>
+                                    <p:set>
+                                      <p:cBhvr>
+                                        <p:cTn id="11" dur="1" fill="hold">
+                                          <p:stCondLst>
+                                            <p:cond delay="0"/>
+                                          </p:stCondLst>
+                                        </p:cTn>
+                                        <p:tgtEl>
+                                          <p:spTgt spid="9"/>
+                                        </p:tgtEl>
+                                        <p:attrNameLst>
+                                          <p:attrName>style.visibility</p:attrName>
+                                        </p:attrNameLst>
+                                      </p:cBhvr>
+                                      <p:to>
+                                        <p:strVal val="visible"/>
+                                      </p:to>
+                                    </p:set>
+                                    <p:animEffect transition="in" filter="wheel(1)">
+                                      <p:cBhvr>
+                                        <p:cTn id="12" dur="2000"/>
+                                        <p:tgtEl>
+                                          <p:spTgt spid="9"/>
+                                        </p:tgtEl>
+                                      </p:cBhvr>
+                                    </p:animEffect>
+                                  </p:childTnLst>
+                                </p:cTn>
+                              </p:par>
+                            </p:childTnLst>
+                          </p:cTn>
+                        </p:par>
+                      </p:childTnLst>
+                    </p:cTn>
+                  </p:par>
+                </p:childTnLst>
+              </p:cTn>
+              <p:prevCondLst>
+                <p:cond evt="onPrev" delay="0">
+                  <p:tgtEl>
+                    <p:sldTgt/>
+                  </p:tgtEl>
+                </p:cond>
+              </p:prevCondLst>
+              <p:nextCondLst>
+                <p:cond evt="onNext" delay="0">
+                  <p:tgtEl>
+                    <p:sldTgt/>
+                  </p:tgtEl>
+                </p:cond>
+              </p:nextCondLst>
+            </p:seq>
+          </p:childTnLst>
+        </p:cTn>
+      </p:par>
+    </p:tnLst>
+  </p:timing>
 </p:sld>
 </file>
 

</xml_diff>